<commit_message>
Added gradle configuration for checkstyle. Small fix in Spring and SpringBoot presentations.
</commit_message>
<xml_diff>
--- a/Spring Boot.pptx
+++ b/Spring Boot.pptx
@@ -18,8 +18,8 @@
     <p:sldId id="268" r:id="rId12"/>
     <p:sldId id="267" r:id="rId13"/>
     <p:sldId id="266" r:id="rId14"/>
-    <p:sldId id="269" r:id="rId15"/>
-    <p:sldId id="270" r:id="rId16"/>
+    <p:sldId id="270" r:id="rId15"/>
+    <p:sldId id="269" r:id="rId16"/>
     <p:sldId id="271" r:id="rId17"/>
     <p:sldId id="272" r:id="rId18"/>
     <p:sldId id="273" r:id="rId19"/>
@@ -301,7 +301,7 @@
           <a:p>
             <a:fld id="{A0B64598-8304-4EC4-8368-F3C08FE8ED32}" type="datetimeFigureOut">
               <a:rPr lang="en-US" smtClean="0"/>
-              <a:t>4/2/24</a:t>
+              <a:t>4/2/25</a:t>
             </a:fld>
             <a:endParaRPr lang="en-US"/>
           </a:p>
@@ -499,7 +499,7 @@
           <a:p>
             <a:fld id="{A0B64598-8304-4EC4-8368-F3C08FE8ED32}" type="datetimeFigureOut">
               <a:rPr lang="en-US" smtClean="0"/>
-              <a:t>4/2/24</a:t>
+              <a:t>4/2/25</a:t>
             </a:fld>
             <a:endParaRPr lang="en-US"/>
           </a:p>
@@ -707,7 +707,7 @@
           <a:p>
             <a:fld id="{A0B64598-8304-4EC4-8368-F3C08FE8ED32}" type="datetimeFigureOut">
               <a:rPr lang="en-US" smtClean="0"/>
-              <a:t>4/2/24</a:t>
+              <a:t>4/2/25</a:t>
             </a:fld>
             <a:endParaRPr lang="en-US"/>
           </a:p>
@@ -905,7 +905,7 @@
           <a:p>
             <a:fld id="{A0B64598-8304-4EC4-8368-F3C08FE8ED32}" type="datetimeFigureOut">
               <a:rPr lang="en-US" smtClean="0"/>
-              <a:t>4/2/24</a:t>
+              <a:t>4/2/25</a:t>
             </a:fld>
             <a:endParaRPr lang="en-US"/>
           </a:p>
@@ -1180,7 +1180,7 @@
           <a:p>
             <a:fld id="{A0B64598-8304-4EC4-8368-F3C08FE8ED32}" type="datetimeFigureOut">
               <a:rPr lang="en-US" smtClean="0"/>
-              <a:t>4/2/24</a:t>
+              <a:t>4/2/25</a:t>
             </a:fld>
             <a:endParaRPr lang="en-US"/>
           </a:p>
@@ -1445,7 +1445,7 @@
           <a:p>
             <a:fld id="{A0B64598-8304-4EC4-8368-F3C08FE8ED32}" type="datetimeFigureOut">
               <a:rPr lang="en-US" smtClean="0"/>
-              <a:t>4/2/24</a:t>
+              <a:t>4/2/25</a:t>
             </a:fld>
             <a:endParaRPr lang="en-US"/>
           </a:p>
@@ -1857,7 +1857,7 @@
           <a:p>
             <a:fld id="{A0B64598-8304-4EC4-8368-F3C08FE8ED32}" type="datetimeFigureOut">
               <a:rPr lang="en-US" smtClean="0"/>
-              <a:t>4/2/24</a:t>
+              <a:t>4/2/25</a:t>
             </a:fld>
             <a:endParaRPr lang="en-US"/>
           </a:p>
@@ -1998,7 +1998,7 @@
           <a:p>
             <a:fld id="{A0B64598-8304-4EC4-8368-F3C08FE8ED32}" type="datetimeFigureOut">
               <a:rPr lang="en-US" smtClean="0"/>
-              <a:t>4/2/24</a:t>
+              <a:t>4/2/25</a:t>
             </a:fld>
             <a:endParaRPr lang="en-US"/>
           </a:p>
@@ -2111,7 +2111,7 @@
           <a:p>
             <a:fld id="{A0B64598-8304-4EC4-8368-F3C08FE8ED32}" type="datetimeFigureOut">
               <a:rPr lang="en-US" smtClean="0"/>
-              <a:t>4/2/24</a:t>
+              <a:t>4/2/25</a:t>
             </a:fld>
             <a:endParaRPr lang="en-US"/>
           </a:p>
@@ -2422,7 +2422,7 @@
           <a:p>
             <a:fld id="{A0B64598-8304-4EC4-8368-F3C08FE8ED32}" type="datetimeFigureOut">
               <a:rPr lang="en-US" smtClean="0"/>
-              <a:t>4/2/24</a:t>
+              <a:t>4/2/25</a:t>
             </a:fld>
             <a:endParaRPr lang="en-US"/>
           </a:p>
@@ -2710,7 +2710,7 @@
           <a:p>
             <a:fld id="{A0B64598-8304-4EC4-8368-F3C08FE8ED32}" type="datetimeFigureOut">
               <a:rPr lang="en-US" smtClean="0"/>
-              <a:t>4/2/24</a:t>
+              <a:t>4/2/25</a:t>
             </a:fld>
             <a:endParaRPr lang="en-US"/>
           </a:p>
@@ -2951,7 +2951,7 @@
           <a:p>
             <a:fld id="{A0B64598-8304-4EC4-8368-F3C08FE8ED32}" type="datetimeFigureOut">
               <a:rPr lang="en-US" smtClean="0"/>
-              <a:t>4/2/24</a:t>
+              <a:t>4/2/25</a:t>
             </a:fld>
             <a:endParaRPr lang="en-US"/>
           </a:p>
@@ -4233,151 +4233,57 @@
           <a:chExt cx="0" cy="0"/>
         </a:xfrm>
       </p:grpSpPr>
-      <p:sp>
-        <p:nvSpPr>
-          <p:cNvPr id="2" name="Title 1">
-            <a:extLst>
-              <a:ext uri="{FF2B5EF4-FFF2-40B4-BE49-F238E27FC236}">
-                <a16:creationId xmlns:a16="http://schemas.microsoft.com/office/drawing/2014/main" id="{54B4A1BF-CF13-48AF-8116-77E5949F54B7}"/>
-              </a:ext>
-            </a:extLst>
-          </p:cNvPr>
-          <p:cNvSpPr>
-            <a:spLocks noGrp="1"/>
-          </p:cNvSpPr>
-          <p:nvPr>
-            <p:ph type="title"/>
-          </p:nvPr>
-        </p:nvSpPr>
-        <p:spPr/>
-        <p:txBody>
-          <a:bodyPr/>
-          <a:lstStyle/>
-          <a:p>
-            <a:r>
-              <a:rPr lang="en-US" dirty="0" err="1"/>
-              <a:t>AutoConfiguration</a:t>
-            </a:r>
-            <a:endParaRPr lang="en-US" dirty="0"/>
-          </a:p>
-        </p:txBody>
-      </p:sp>
-      <p:sp>
-        <p:nvSpPr>
-          <p:cNvPr id="3" name="Content Placeholder 2">
-            <a:extLst>
-              <a:ext uri="{FF2B5EF4-FFF2-40B4-BE49-F238E27FC236}">
-                <a16:creationId xmlns:a16="http://schemas.microsoft.com/office/drawing/2014/main" id="{D3106D5F-0C86-4BD3-BE33-1322F9B08EB3}"/>
-              </a:ext>
-            </a:extLst>
-          </p:cNvPr>
-          <p:cNvSpPr>
-            <a:spLocks noGrp="1"/>
-          </p:cNvSpPr>
-          <p:nvPr>
-            <p:ph idx="1"/>
-          </p:nvPr>
-        </p:nvSpPr>
-        <p:spPr/>
-        <p:txBody>
-          <a:bodyPr>
-            <a:normAutofit fontScale="92500"/>
-          </a:bodyPr>
-          <a:lstStyle/>
-          <a:p>
-            <a:pPr marL="0" indent="0">
-              <a:buNone/>
-            </a:pPr>
-            <a:r>
-              <a:rPr lang="ru-RU" dirty="0"/>
-              <a:t>Если вы используете </a:t>
-            </a:r>
-            <a:r>
-              <a:rPr lang="ru-RU" b="1" dirty="0" err="1"/>
-              <a:t>spring-boot-starter-jdbc</a:t>
-            </a:r>
-            <a:r>
-              <a:rPr lang="ru-RU" dirty="0"/>
-              <a:t>, Spring Boot автоматически регистрирует </a:t>
-            </a:r>
-            <a:r>
-              <a:rPr lang="ru-RU" dirty="0" err="1"/>
-              <a:t>бины</a:t>
-            </a:r>
-            <a:r>
-              <a:rPr lang="ru-RU" dirty="0"/>
-              <a:t> </a:t>
-            </a:r>
-            <a:r>
-              <a:rPr lang="ru-RU" b="1" dirty="0" err="1"/>
-              <a:t>DataSource</a:t>
-            </a:r>
-            <a:r>
-              <a:rPr lang="ru-RU" b="1" dirty="0"/>
-              <a:t>, </a:t>
-            </a:r>
-            <a:r>
-              <a:rPr lang="ru-RU" b="1" dirty="0" err="1"/>
-              <a:t>EntityManagerFactory</a:t>
-            </a:r>
-            <a:r>
-              <a:rPr lang="ru-RU" b="1" dirty="0"/>
-              <a:t>, </a:t>
-            </a:r>
-            <a:r>
-              <a:rPr lang="ru-RU" b="1" dirty="0" err="1"/>
-              <a:t>TransactionManager</a:t>
-            </a:r>
-            <a:r>
-              <a:rPr lang="ru-RU" dirty="0"/>
-              <a:t> и считывает информацию для подключения к базе данных из файла </a:t>
-            </a:r>
-            <a:r>
-              <a:rPr lang="ru-RU" b="1" dirty="0" err="1"/>
-              <a:t>application.properties</a:t>
-            </a:r>
-            <a:r>
-              <a:rPr lang="ru-RU" dirty="0"/>
-              <a:t>.</a:t>
-            </a:r>
-          </a:p>
-          <a:p>
-            <a:pPr marL="0" indent="0">
-              <a:buNone/>
-            </a:pPr>
-            <a:r>
-              <a:rPr lang="ru-RU" dirty="0"/>
-              <a:t>Если вы не собираетесь использовать базу данных, и не предоставляете никаких подробных сведений о подключении в ручном режиме, Spring Boot автоматически настроит базу в памяти, без какой-либо дополнительной конфигурации с вашей стороны (при наличии H2 или HSQL </a:t>
-            </a:r>
-            <a:r>
-              <a:rPr lang="en-US" dirty="0"/>
-              <a:t>Driver’</a:t>
-            </a:r>
-            <a:r>
-              <a:rPr lang="ru-RU" dirty="0" err="1"/>
-              <a:t>ов</a:t>
-            </a:r>
-            <a:r>
-              <a:rPr lang="ru-RU" dirty="0"/>
-              <a:t>).</a:t>
-            </a:r>
-          </a:p>
-          <a:p>
-            <a:pPr marL="0" indent="0">
-              <a:buNone/>
-            </a:pPr>
-            <a:r>
-              <a:rPr lang="ru-RU" dirty="0"/>
-              <a:t>Автоматическая конфигурация может быть полностью переопределена в любой момент с помощью пользовательских настроек.</a:t>
-            </a:r>
-            <a:endParaRPr lang="en-US" dirty="0"/>
-          </a:p>
-        </p:txBody>
-      </p:sp>
+      <p:pic>
+        <p:nvPicPr>
+          <p:cNvPr id="2050" name="Picture 2">
+            <a:extLst>
+              <a:ext uri="{FF2B5EF4-FFF2-40B4-BE49-F238E27FC236}">
+                <a16:creationId xmlns:a16="http://schemas.microsoft.com/office/drawing/2014/main" id="{4756341C-B98F-4FF1-8DD8-0768B18A57D6}"/>
+              </a:ext>
+            </a:extLst>
+          </p:cNvPr>
+          <p:cNvPicPr>
+            <a:picLocks noChangeAspect="1" noChangeArrowheads="1"/>
+          </p:cNvPicPr>
+          <p:nvPr/>
+        </p:nvPicPr>
+        <p:blipFill>
+          <a:blip r:embed="rId2">
+            <a:extLst>
+              <a:ext uri="{28A0092B-C50C-407E-A947-70E740481C1C}">
+                <a14:useLocalDpi xmlns:a14="http://schemas.microsoft.com/office/drawing/2010/main" val="0"/>
+              </a:ext>
+            </a:extLst>
+          </a:blip>
+          <a:srcRect/>
+          <a:stretch>
+            <a:fillRect/>
+          </a:stretch>
+        </p:blipFill>
+        <p:spPr bwMode="auto">
+          <a:xfrm>
+            <a:off x="0" y="8792"/>
+            <a:ext cx="12192000" cy="6856413"/>
+          </a:xfrm>
+          <a:prstGeom prst="rect">
+            <a:avLst/>
+          </a:prstGeom>
+          <a:noFill/>
+          <a:extLst>
+            <a:ext uri="{909E8E84-426E-40DD-AFC4-6F175D3DCCD1}">
+              <a14:hiddenFill xmlns:a14="http://schemas.microsoft.com/office/drawing/2010/main">
+                <a:solidFill>
+                  <a:srgbClr val="FFFFFF"/>
+                </a:solidFill>
+              </a14:hiddenFill>
+            </a:ext>
+          </a:extLst>
+        </p:spPr>
+      </p:pic>
     </p:spTree>
     <p:extLst>
       <p:ext uri="{BB962C8B-B14F-4D97-AF65-F5344CB8AC3E}">
-        <p14:creationId xmlns:p14="http://schemas.microsoft.com/office/powerpoint/2010/main" val="2472501394"/>
+        <p14:creationId xmlns:p14="http://schemas.microsoft.com/office/powerpoint/2010/main" val="3976529273"/>
       </p:ext>
     </p:extLst>
   </p:cSld>
@@ -4404,57 +4310,151 @@
           <a:chExt cx="0" cy="0"/>
         </a:xfrm>
       </p:grpSpPr>
-      <p:pic>
-        <p:nvPicPr>
-          <p:cNvPr id="2050" name="Picture 2">
-            <a:extLst>
-              <a:ext uri="{FF2B5EF4-FFF2-40B4-BE49-F238E27FC236}">
-                <a16:creationId xmlns:a16="http://schemas.microsoft.com/office/drawing/2014/main" id="{4756341C-B98F-4FF1-8DD8-0768B18A57D6}"/>
-              </a:ext>
-            </a:extLst>
-          </p:cNvPr>
-          <p:cNvPicPr>
-            <a:picLocks noChangeAspect="1" noChangeArrowheads="1"/>
-          </p:cNvPicPr>
-          <p:nvPr/>
-        </p:nvPicPr>
-        <p:blipFill>
-          <a:blip r:embed="rId2">
-            <a:extLst>
-              <a:ext uri="{28A0092B-C50C-407E-A947-70E740481C1C}">
-                <a14:useLocalDpi xmlns:a14="http://schemas.microsoft.com/office/drawing/2010/main" val="0"/>
-              </a:ext>
-            </a:extLst>
-          </a:blip>
-          <a:srcRect/>
-          <a:stretch>
-            <a:fillRect/>
-          </a:stretch>
-        </p:blipFill>
-        <p:spPr bwMode="auto">
-          <a:xfrm>
-            <a:off x="0" y="0"/>
-            <a:ext cx="12192000" cy="6856413"/>
-          </a:xfrm>
-          <a:prstGeom prst="rect">
-            <a:avLst/>
-          </a:prstGeom>
-          <a:noFill/>
-          <a:extLst>
-            <a:ext uri="{909E8E84-426E-40DD-AFC4-6F175D3DCCD1}">
-              <a14:hiddenFill xmlns:a14="http://schemas.microsoft.com/office/drawing/2010/main">
-                <a:solidFill>
-                  <a:srgbClr val="FFFFFF"/>
-                </a:solidFill>
-              </a14:hiddenFill>
-            </a:ext>
-          </a:extLst>
-        </p:spPr>
-      </p:pic>
+      <p:sp>
+        <p:nvSpPr>
+          <p:cNvPr id="2" name="Title 1">
+            <a:extLst>
+              <a:ext uri="{FF2B5EF4-FFF2-40B4-BE49-F238E27FC236}">
+                <a16:creationId xmlns:a16="http://schemas.microsoft.com/office/drawing/2014/main" id="{54B4A1BF-CF13-48AF-8116-77E5949F54B7}"/>
+              </a:ext>
+            </a:extLst>
+          </p:cNvPr>
+          <p:cNvSpPr>
+            <a:spLocks noGrp="1"/>
+          </p:cNvSpPr>
+          <p:nvPr>
+            <p:ph type="title"/>
+          </p:nvPr>
+        </p:nvSpPr>
+        <p:spPr/>
+        <p:txBody>
+          <a:bodyPr/>
+          <a:lstStyle/>
+          <a:p>
+            <a:r>
+              <a:rPr lang="en-US" dirty="0" err="1"/>
+              <a:t>AutoConfiguration</a:t>
+            </a:r>
+            <a:endParaRPr lang="en-US" dirty="0"/>
+          </a:p>
+        </p:txBody>
+      </p:sp>
+      <p:sp>
+        <p:nvSpPr>
+          <p:cNvPr id="3" name="Content Placeholder 2">
+            <a:extLst>
+              <a:ext uri="{FF2B5EF4-FFF2-40B4-BE49-F238E27FC236}">
+                <a16:creationId xmlns:a16="http://schemas.microsoft.com/office/drawing/2014/main" id="{D3106D5F-0C86-4BD3-BE33-1322F9B08EB3}"/>
+              </a:ext>
+            </a:extLst>
+          </p:cNvPr>
+          <p:cNvSpPr>
+            <a:spLocks noGrp="1"/>
+          </p:cNvSpPr>
+          <p:nvPr>
+            <p:ph idx="1"/>
+          </p:nvPr>
+        </p:nvSpPr>
+        <p:spPr/>
+        <p:txBody>
+          <a:bodyPr>
+            <a:normAutofit fontScale="92500"/>
+          </a:bodyPr>
+          <a:lstStyle/>
+          <a:p>
+            <a:pPr marL="0" indent="0">
+              <a:buNone/>
+            </a:pPr>
+            <a:r>
+              <a:rPr lang="ru-RU" dirty="0"/>
+              <a:t>Если вы используете </a:t>
+            </a:r>
+            <a:r>
+              <a:rPr lang="ru-RU" b="1" dirty="0" err="1"/>
+              <a:t>spring-boot-starter-jdbc</a:t>
+            </a:r>
+            <a:r>
+              <a:rPr lang="ru-RU" dirty="0"/>
+              <a:t>, Spring Boot автоматически регистрирует </a:t>
+            </a:r>
+            <a:r>
+              <a:rPr lang="ru-RU" dirty="0" err="1"/>
+              <a:t>бины</a:t>
+            </a:r>
+            <a:r>
+              <a:rPr lang="ru-RU" dirty="0"/>
+              <a:t> </a:t>
+            </a:r>
+            <a:r>
+              <a:rPr lang="ru-RU" b="1" dirty="0" err="1"/>
+              <a:t>DataSource</a:t>
+            </a:r>
+            <a:r>
+              <a:rPr lang="ru-RU" b="1" dirty="0"/>
+              <a:t>, </a:t>
+            </a:r>
+            <a:r>
+              <a:rPr lang="ru-RU" b="1" dirty="0" err="1"/>
+              <a:t>EntityManagerFactory</a:t>
+            </a:r>
+            <a:r>
+              <a:rPr lang="ru-RU" b="1" dirty="0"/>
+              <a:t>, </a:t>
+            </a:r>
+            <a:r>
+              <a:rPr lang="ru-RU" b="1" dirty="0" err="1"/>
+              <a:t>TransactionManager</a:t>
+            </a:r>
+            <a:r>
+              <a:rPr lang="ru-RU" dirty="0"/>
+              <a:t> и считывает информацию для подключения к базе данных из файла </a:t>
+            </a:r>
+            <a:r>
+              <a:rPr lang="ru-RU" b="1" dirty="0" err="1"/>
+              <a:t>application.properties</a:t>
+            </a:r>
+            <a:r>
+              <a:rPr lang="ru-RU" dirty="0"/>
+              <a:t>.</a:t>
+            </a:r>
+          </a:p>
+          <a:p>
+            <a:pPr marL="0" indent="0">
+              <a:buNone/>
+            </a:pPr>
+            <a:r>
+              <a:rPr lang="ru-RU" dirty="0"/>
+              <a:t>Если вы не собираетесь использовать базу данных, и не предоставляете никаких подробных сведений о подключении в ручном режиме, Spring Boot автоматически настроит базу в памяти, без какой-либо дополнительной конфигурации с вашей стороны (при наличии H2 или HSQL </a:t>
+            </a:r>
+            <a:r>
+              <a:rPr lang="en-US" dirty="0"/>
+              <a:t>Driver’</a:t>
+            </a:r>
+            <a:r>
+              <a:rPr lang="ru-RU" dirty="0" err="1"/>
+              <a:t>ов</a:t>
+            </a:r>
+            <a:r>
+              <a:rPr lang="ru-RU" dirty="0"/>
+              <a:t>).</a:t>
+            </a:r>
+          </a:p>
+          <a:p>
+            <a:pPr marL="0" indent="0">
+              <a:buNone/>
+            </a:pPr>
+            <a:r>
+              <a:rPr lang="ru-RU" dirty="0"/>
+              <a:t>Автоматическая конфигурация может быть полностью переопределена в любой момент с помощью пользовательских настроек.</a:t>
+            </a:r>
+            <a:endParaRPr lang="en-US" dirty="0"/>
+          </a:p>
+        </p:txBody>
+      </p:sp>
     </p:spTree>
     <p:extLst>
       <p:ext uri="{BB962C8B-B14F-4D97-AF65-F5344CB8AC3E}">
-        <p14:creationId xmlns:p14="http://schemas.microsoft.com/office/powerpoint/2010/main" val="3976529273"/>
+        <p14:creationId xmlns:p14="http://schemas.microsoft.com/office/powerpoint/2010/main" val="2472501394"/>
       </p:ext>
     </p:extLst>
   </p:cSld>
@@ -5174,15 +5174,7 @@
             </a:r>
             <a:r>
               <a:rPr lang="ru-RU" dirty="0"/>
-              <a:t>, но вы не сконфигурировали вручную никаких </a:t>
-            </a:r>
-            <a:r>
-              <a:rPr lang="ru-RU" dirty="0" err="1"/>
-              <a:t>бинов</a:t>
-            </a:r>
-            <a:r>
-              <a:rPr lang="ru-RU" dirty="0"/>
-              <a:t> для подключения к базе данных, то Spring Boot автоматически сконфигурирует резидентную базу данных.</a:t>
+              <a:t>, но вы не сконфигурировали вручную никаких бинов для подключения к базе данных, то Spring Boot автоматически сконфигурирует базу данных.</a:t>
             </a:r>
           </a:p>
           <a:p>
@@ -5215,11 +5207,11 @@
             </a:r>
             <a:r>
               <a:rPr lang="ru-RU" dirty="0"/>
-              <a:t> в один из ваших классов с аннотацией </a:t>
-            </a:r>
-            <a:r>
-              <a:rPr lang="ru-RU" b="1" dirty="0"/>
-              <a:t>@Configuration</a:t>
+              <a:t> в один из ваших классов с аннотацией в класс, где находится метод </a:t>
+            </a:r>
+            <a:r>
+              <a:rPr lang="en-US" dirty="0"/>
+              <a:t>main()</a:t>
             </a:r>
             <a:r>
               <a:rPr lang="ru-RU" dirty="0"/>

</xml_diff>